<commit_message>
pivot to radar charts
</commit_message>
<xml_diff>
--- a/presentations/jazz_recs.pptx
+++ b/presentations/jazz_recs.pptx
@@ -9,13 +9,15 @@
     <p:sldId id="257" r:id="rId3"/>
     <p:sldId id="258" r:id="rId4"/>
     <p:sldId id="259" r:id="rId5"/>
-    <p:sldId id="260" r:id="rId6"/>
-    <p:sldId id="264" r:id="rId7"/>
+    <p:sldId id="268" r:id="rId6"/>
+    <p:sldId id="260" r:id="rId7"/>
     <p:sldId id="266" r:id="rId8"/>
-    <p:sldId id="261" r:id="rId9"/>
+    <p:sldId id="269" r:id="rId9"/>
     <p:sldId id="262" r:id="rId10"/>
     <p:sldId id="265" r:id="rId11"/>
-    <p:sldId id="263" r:id="rId12"/>
+    <p:sldId id="267" r:id="rId12"/>
+    <p:sldId id="261" r:id="rId13"/>
+    <p:sldId id="263" r:id="rId14"/>
   </p:sldIdLst>
   <p:sldSz cx="12192000" cy="6858000"/>
   <p:notesSz cx="6858000" cy="9144000"/>
@@ -5590,7 +5592,24 @@
           <a:bodyPr/>
           <a:lstStyle/>
           <a:p>
-            <a:endParaRPr lang="en-US" dirty="0"/>
+            <a:r>
+              <a:rPr lang="en-US" dirty="0"/>
+              <a:t>Representation of words and instruments as topics</a:t>
+            </a:r>
+          </a:p>
+          <a:p>
+            <a:r>
+              <a:rPr lang="en-US" dirty="0"/>
+              <a:t>These are used as </a:t>
+            </a:r>
+            <a:r>
+              <a:rPr lang="en-US" dirty="0" err="1"/>
+              <a:t>descriptives</a:t>
+            </a:r>
+            <a:r>
+              <a:rPr lang="en-US" dirty="0"/>
+              <a:t> for the audience to understand the nature of the album</a:t>
+            </a:r>
           </a:p>
         </p:txBody>
       </p:sp>
@@ -5608,6 +5627,228 @@
 </file>
 
 <file path=ppt/slides/slide11.xml><?xml version="1.0" encoding="utf-8"?>
+<p:sld xmlns:a="http://schemas.openxmlformats.org/drawingml/2006/main" xmlns:r="http://schemas.openxmlformats.org/officeDocument/2006/relationships" xmlns:p="http://schemas.openxmlformats.org/presentationml/2006/main">
+  <p:cSld>
+    <p:spTree>
+      <p:nvGrpSpPr>
+        <p:cNvPr id="1" name=""/>
+        <p:cNvGrpSpPr/>
+        <p:nvPr/>
+      </p:nvGrpSpPr>
+      <p:grpSpPr>
+        <a:xfrm>
+          <a:off x="0" y="0"/>
+          <a:ext cx="0" cy="0"/>
+          <a:chOff x="0" y="0"/>
+          <a:chExt cx="0" cy="0"/>
+        </a:xfrm>
+      </p:grpSpPr>
+      <p:sp>
+        <p:nvSpPr>
+          <p:cNvPr id="2" name="Title 1">
+            <a:extLst>
+              <a:ext uri="{FF2B5EF4-FFF2-40B4-BE49-F238E27FC236}">
+                <a16:creationId xmlns:a16="http://schemas.microsoft.com/office/drawing/2014/main" id="{12D8F8C8-7CD3-8646-81FC-0359A8A455D3}"/>
+              </a:ext>
+            </a:extLst>
+          </p:cNvPr>
+          <p:cNvSpPr>
+            <a:spLocks noGrp="1"/>
+          </p:cNvSpPr>
+          <p:nvPr>
+            <p:ph type="title"/>
+          </p:nvPr>
+        </p:nvSpPr>
+        <p:spPr/>
+        <p:txBody>
+          <a:bodyPr/>
+          <a:lstStyle/>
+          <a:p>
+            <a:r>
+              <a:rPr lang="en-US" dirty="0"/>
+              <a:t>Layer 3: Audio Features</a:t>
+            </a:r>
+          </a:p>
+        </p:txBody>
+      </p:sp>
+      <p:sp>
+        <p:nvSpPr>
+          <p:cNvPr id="3" name="Content Placeholder 2">
+            <a:extLst>
+              <a:ext uri="{FF2B5EF4-FFF2-40B4-BE49-F238E27FC236}">
+                <a16:creationId xmlns:a16="http://schemas.microsoft.com/office/drawing/2014/main" id="{C89F107E-A90E-4E43-9EC3-6CB339700A31}"/>
+              </a:ext>
+            </a:extLst>
+          </p:cNvPr>
+          <p:cNvSpPr>
+            <a:spLocks noGrp="1"/>
+          </p:cNvSpPr>
+          <p:nvPr>
+            <p:ph idx="1"/>
+          </p:nvPr>
+        </p:nvSpPr>
+        <p:spPr/>
+        <p:txBody>
+          <a:bodyPr/>
+          <a:lstStyle/>
+          <a:p>
+            <a:r>
+              <a:rPr lang="en-US" dirty="0"/>
+              <a:t>Overall graph of audio features of albums</a:t>
+            </a:r>
+          </a:p>
+          <a:p>
+            <a:r>
+              <a:rPr lang="en-US" dirty="0"/>
+              <a:t>Some interesting distinctions between genres and audio features</a:t>
+            </a:r>
+          </a:p>
+        </p:txBody>
+      </p:sp>
+    </p:spTree>
+    <p:extLst>
+      <p:ext uri="{BB962C8B-B14F-4D97-AF65-F5344CB8AC3E}">
+        <p14:creationId xmlns:p14="http://schemas.microsoft.com/office/powerpoint/2010/main" val="585473345"/>
+      </p:ext>
+    </p:extLst>
+  </p:cSld>
+  <p:clrMapOvr>
+    <a:masterClrMapping/>
+  </p:clrMapOvr>
+</p:sld>
+</file>
+
+<file path=ppt/slides/slide12.xml><?xml version="1.0" encoding="utf-8"?>
+<p:sld xmlns:a="http://schemas.openxmlformats.org/drawingml/2006/main" xmlns:r="http://schemas.openxmlformats.org/officeDocument/2006/relationships" xmlns:p="http://schemas.openxmlformats.org/presentationml/2006/main">
+  <p:cSld>
+    <p:spTree>
+      <p:nvGrpSpPr>
+        <p:cNvPr id="1" name=""/>
+        <p:cNvGrpSpPr/>
+        <p:nvPr/>
+      </p:nvGrpSpPr>
+      <p:grpSpPr>
+        <a:xfrm>
+          <a:off x="0" y="0"/>
+          <a:ext cx="0" cy="0"/>
+          <a:chOff x="0" y="0"/>
+          <a:chExt cx="0" cy="0"/>
+        </a:xfrm>
+      </p:grpSpPr>
+      <p:sp>
+        <p:nvSpPr>
+          <p:cNvPr id="2" name="Title 1">
+            <a:extLst>
+              <a:ext uri="{FF2B5EF4-FFF2-40B4-BE49-F238E27FC236}">
+                <a16:creationId xmlns:a16="http://schemas.microsoft.com/office/drawing/2014/main" id="{68F4FBDE-CEC6-1E46-9310-389B1E09CD78}"/>
+              </a:ext>
+            </a:extLst>
+          </p:cNvPr>
+          <p:cNvSpPr>
+            <a:spLocks noGrp="1"/>
+          </p:cNvSpPr>
+          <p:nvPr>
+            <p:ph type="title"/>
+          </p:nvPr>
+        </p:nvSpPr>
+        <p:spPr/>
+        <p:txBody>
+          <a:bodyPr/>
+          <a:lstStyle/>
+          <a:p>
+            <a:r>
+              <a:rPr lang="en-US" dirty="0"/>
+              <a:t>Content-based Model</a:t>
+            </a:r>
+          </a:p>
+        </p:txBody>
+      </p:sp>
+      <p:sp>
+        <p:nvSpPr>
+          <p:cNvPr id="3" name="Content Placeholder 2">
+            <a:extLst>
+              <a:ext uri="{FF2B5EF4-FFF2-40B4-BE49-F238E27FC236}">
+                <a16:creationId xmlns:a16="http://schemas.microsoft.com/office/drawing/2014/main" id="{67A8C402-CA98-BB4A-89D2-96BE85A96C71}"/>
+              </a:ext>
+            </a:extLst>
+          </p:cNvPr>
+          <p:cNvSpPr>
+            <a:spLocks noGrp="1"/>
+          </p:cNvSpPr>
+          <p:nvPr>
+            <p:ph idx="1"/>
+          </p:nvPr>
+        </p:nvSpPr>
+        <p:spPr/>
+        <p:txBody>
+          <a:bodyPr/>
+          <a:lstStyle/>
+          <a:p>
+            <a:r>
+              <a:rPr lang="en-US" dirty="0"/>
+              <a:t>1. Cosine sim – using TF-IDF and Cosine sim</a:t>
+            </a:r>
+          </a:p>
+          <a:p>
+            <a:pPr lvl="1"/>
+            <a:r>
+              <a:rPr lang="en-US" dirty="0"/>
+              <a:t>Examples of similar albums</a:t>
+            </a:r>
+          </a:p>
+          <a:p>
+            <a:r>
+              <a:rPr lang="en-US" dirty="0"/>
+              <a:t>2. Cosine sim - using PCA and Cosine sim</a:t>
+            </a:r>
+          </a:p>
+          <a:p>
+            <a:pPr lvl="1"/>
+            <a:r>
+              <a:rPr lang="en-US" dirty="0"/>
+              <a:t>Examples of similar albums</a:t>
+            </a:r>
+          </a:p>
+          <a:p>
+            <a:pPr lvl="1"/>
+            <a:endParaRPr lang="en-US" dirty="0"/>
+          </a:p>
+          <a:p>
+            <a:pPr lvl="1"/>
+            <a:endParaRPr lang="en-US" dirty="0"/>
+          </a:p>
+          <a:p>
+            <a:pPr lvl="1"/>
+            <a:endParaRPr lang="en-US" dirty="0"/>
+          </a:p>
+          <a:p>
+            <a:pPr lvl="1"/>
+            <a:r>
+              <a:rPr lang="en-US" dirty="0"/>
+              <a:t>Some images to show how </a:t>
+            </a:r>
+            <a:r>
+              <a:rPr lang="en-US"/>
+              <a:t>similarity works</a:t>
+            </a:r>
+            <a:endParaRPr lang="en-US" dirty="0"/>
+          </a:p>
+        </p:txBody>
+      </p:sp>
+    </p:spTree>
+    <p:extLst>
+      <p:ext uri="{BB962C8B-B14F-4D97-AF65-F5344CB8AC3E}">
+        <p14:creationId xmlns:p14="http://schemas.microsoft.com/office/powerpoint/2010/main" val="480988961"/>
+      </p:ext>
+    </p:extLst>
+  </p:cSld>
+  <p:clrMapOvr>
+    <a:masterClrMapping/>
+  </p:clrMapOvr>
+</p:sld>
+</file>
+
+<file path=ppt/slides/slide13.xml><?xml version="1.0" encoding="utf-8"?>
 <p:sld xmlns:a="http://schemas.openxmlformats.org/drawingml/2006/main" xmlns:r="http://schemas.openxmlformats.org/officeDocument/2006/relationships" xmlns:p="http://schemas.openxmlformats.org/presentationml/2006/main">
   <p:cSld>
     <p:spTree>
@@ -6601,7 +6842,15 @@
           <a:p>
             <a:r>
               <a:rPr lang="en-US" dirty="0"/>
-              <a:t>Phrase matching (genres)</a:t>
+              <a:t>Pitchfork, </a:t>
+            </a:r>
+            <a:r>
+              <a:rPr lang="en-US" dirty="0" err="1"/>
+              <a:t>jazztimes</a:t>
+            </a:r>
+            <a:r>
+              <a:rPr lang="en-US" dirty="0"/>
+              <a:t>, etc.</a:t>
             </a:r>
           </a:p>
         </p:txBody>
@@ -6641,7 +6890,7 @@
           <p:cNvPr id="2" name="Title 1">
             <a:extLst>
               <a:ext uri="{FF2B5EF4-FFF2-40B4-BE49-F238E27FC236}">
-                <a16:creationId xmlns:a16="http://schemas.microsoft.com/office/drawing/2014/main" id="{5B30CA4D-4F7A-7A4A-9A3C-88256E63CF94}"/>
+                <a16:creationId xmlns:a16="http://schemas.microsoft.com/office/drawing/2014/main" id="{0984F76A-4747-C649-BEBA-CAF2F2D0EB8C}"/>
               </a:ext>
             </a:extLst>
           </p:cNvPr>
@@ -6659,50 +6908,49 @@
           <a:p>
             <a:r>
               <a:rPr lang="en-US" dirty="0"/>
-              <a:t>EDA</a:t>
-            </a:r>
-          </a:p>
-        </p:txBody>
-      </p:sp>
-      <p:pic>
-        <p:nvPicPr>
-          <p:cNvPr id="17" name="Content Placeholder 16">
-            <a:extLst>
-              <a:ext uri="{FF2B5EF4-FFF2-40B4-BE49-F238E27FC236}">
-                <a16:creationId xmlns:a16="http://schemas.microsoft.com/office/drawing/2014/main" id="{7EF4343E-440F-354F-BD01-BEAB38CC5073}"/>
-              </a:ext>
-            </a:extLst>
-          </p:cNvPr>
-          <p:cNvPicPr>
-            <a:picLocks noGrp="1" noChangeAspect="1"/>
-          </p:cNvPicPr>
+              <a:t>Data &amp; Processes</a:t>
+            </a:r>
+          </a:p>
+        </p:txBody>
+      </p:sp>
+      <p:sp>
+        <p:nvSpPr>
+          <p:cNvPr id="3" name="Content Placeholder 2">
+            <a:extLst>
+              <a:ext uri="{FF2B5EF4-FFF2-40B4-BE49-F238E27FC236}">
+                <a16:creationId xmlns:a16="http://schemas.microsoft.com/office/drawing/2014/main" id="{9E37E1A2-B752-3847-B164-6292D06D0A63}"/>
+              </a:ext>
+            </a:extLst>
+          </p:cNvPr>
+          <p:cNvSpPr>
+            <a:spLocks noGrp="1"/>
+          </p:cNvSpPr>
           <p:nvPr>
             <p:ph idx="1"/>
           </p:nvPr>
-        </p:nvPicPr>
-        <p:blipFill>
-          <a:blip r:embed="rId2">
-            <a:extLst>
-              <a:ext uri="{96DAC541-7B7A-43D3-8B79-37D633B846F1}">
-                <asvg:svgBlip xmlns:asvg="http://schemas.microsoft.com/office/drawing/2016/SVG/main" r:embed="rId3"/>
-              </a:ext>
-            </a:extLst>
-          </a:blip>
-          <a:stretch>
-            <a:fillRect/>
-          </a:stretch>
-        </p:blipFill>
-        <p:spPr>
-          <a:xfrm>
-            <a:off x="1627981" y="2496344"/>
-            <a:ext cx="9144000" cy="3657600"/>
-          </a:xfrm>
-        </p:spPr>
-      </p:pic>
+        </p:nvSpPr>
+        <p:spPr/>
+        <p:txBody>
+          <a:bodyPr/>
+          <a:lstStyle/>
+          <a:p>
+            <a:r>
+              <a:rPr lang="en-US" dirty="0"/>
+              <a:t>Phrase matching (genres)</a:t>
+            </a:r>
+          </a:p>
+          <a:p>
+            <a:r>
+              <a:rPr lang="en-US" dirty="0"/>
+              <a:t>Get some images – basic network</a:t>
+            </a:r>
+          </a:p>
+        </p:txBody>
+      </p:sp>
     </p:spTree>
     <p:extLst>
       <p:ext uri="{BB962C8B-B14F-4D97-AF65-F5344CB8AC3E}">
-        <p14:creationId xmlns:p14="http://schemas.microsoft.com/office/powerpoint/2010/main" val="2844890790"/>
+        <p14:creationId xmlns:p14="http://schemas.microsoft.com/office/powerpoint/2010/main" val="2390030559"/>
       </p:ext>
     </p:extLst>
   </p:cSld>
@@ -6759,10 +7007,10 @@
       </p:sp>
       <p:pic>
         <p:nvPicPr>
-          <p:cNvPr id="21" name="Content Placeholder 20">
-            <a:extLst>
-              <a:ext uri="{FF2B5EF4-FFF2-40B4-BE49-F238E27FC236}">
-                <a16:creationId xmlns:a16="http://schemas.microsoft.com/office/drawing/2014/main" id="{092DCF32-88F2-4C48-B528-E9A0B9CDA8B2}"/>
+          <p:cNvPr id="17" name="Content Placeholder 16">
+            <a:extLst>
+              <a:ext uri="{FF2B5EF4-FFF2-40B4-BE49-F238E27FC236}">
+                <a16:creationId xmlns:a16="http://schemas.microsoft.com/office/drawing/2014/main" id="{7EF4343E-440F-354F-BD01-BEAB38CC5073}"/>
               </a:ext>
             </a:extLst>
           </p:cNvPr>
@@ -6787,98 +7035,26 @@
         </p:blipFill>
         <p:spPr>
           <a:xfrm>
-            <a:off x="120073" y="2370697"/>
-            <a:ext cx="4362641" cy="3271981"/>
+            <a:off x="1627981" y="2496344"/>
+            <a:ext cx="9144000" cy="3657600"/>
           </a:xfrm>
         </p:spPr>
       </p:pic>
-      <p:pic>
-        <p:nvPicPr>
-          <p:cNvPr id="23" name="Graphic 22">
-            <a:extLst>
-              <a:ext uri="{FF2B5EF4-FFF2-40B4-BE49-F238E27FC236}">
-                <a16:creationId xmlns:a16="http://schemas.microsoft.com/office/drawing/2014/main" id="{812FCD58-3719-184C-A6C1-E754C3D7C643}"/>
-              </a:ext>
-            </a:extLst>
-          </p:cNvPr>
-          <p:cNvPicPr>
-            <a:picLocks noChangeAspect="1"/>
-          </p:cNvPicPr>
+      <p:sp>
+        <p:nvSpPr>
+          <p:cNvPr id="18" name="TextBox 17">
+            <a:extLst>
+              <a:ext uri="{FF2B5EF4-FFF2-40B4-BE49-F238E27FC236}">
+                <a16:creationId xmlns:a16="http://schemas.microsoft.com/office/drawing/2014/main" id="{25FD4A8E-616B-4A48-81E9-15DA1018A830}"/>
+              </a:ext>
+            </a:extLst>
+          </p:cNvPr>
+          <p:cNvSpPr txBox="1"/>
           <p:nvPr/>
-        </p:nvPicPr>
-        <p:blipFill>
-          <a:blip r:embed="rId4">
-            <a:extLst>
-              <a:ext uri="{96DAC541-7B7A-43D3-8B79-37D633B846F1}">
-                <asvg:svgBlip xmlns:asvg="http://schemas.microsoft.com/office/drawing/2016/SVG/main" r:embed="rId5"/>
-              </a:ext>
-            </a:extLst>
-          </a:blip>
-          <a:stretch>
-            <a:fillRect/>
-          </a:stretch>
-        </p:blipFill>
+        </p:nvSpPr>
         <p:spPr>
           <a:xfrm>
-            <a:off x="4482714" y="2453825"/>
-            <a:ext cx="3767450" cy="2825588"/>
-          </a:xfrm>
-          <a:prstGeom prst="rect">
-            <a:avLst/>
-          </a:prstGeom>
-        </p:spPr>
-      </p:pic>
-      <p:pic>
-        <p:nvPicPr>
-          <p:cNvPr id="25" name="Graphic 24">
-            <a:extLst>
-              <a:ext uri="{FF2B5EF4-FFF2-40B4-BE49-F238E27FC236}">
-                <a16:creationId xmlns:a16="http://schemas.microsoft.com/office/drawing/2014/main" id="{7C1D6728-799E-8642-900C-76674B132B03}"/>
-              </a:ext>
-            </a:extLst>
-          </p:cNvPr>
-          <p:cNvPicPr>
-            <a:picLocks noChangeAspect="1"/>
-          </p:cNvPicPr>
-          <p:nvPr/>
-        </p:nvPicPr>
-        <p:blipFill>
-          <a:blip r:embed="rId6">
-            <a:extLst>
-              <a:ext uri="{96DAC541-7B7A-43D3-8B79-37D633B846F1}">
-                <asvg:svgBlip xmlns:asvg="http://schemas.microsoft.com/office/drawing/2016/SVG/main" r:embed="rId7"/>
-              </a:ext>
-            </a:extLst>
-          </a:blip>
-          <a:stretch>
-            <a:fillRect/>
-          </a:stretch>
-        </p:blipFill>
-        <p:spPr>
-          <a:xfrm>
-            <a:off x="8033544" y="2352225"/>
-            <a:ext cx="4038383" cy="3028787"/>
-          </a:xfrm>
-          <a:prstGeom prst="rect">
-            <a:avLst/>
-          </a:prstGeom>
-        </p:spPr>
-      </p:pic>
-      <p:sp>
-        <p:nvSpPr>
-          <p:cNvPr id="26" name="TextBox 25">
-            <a:extLst>
-              <a:ext uri="{FF2B5EF4-FFF2-40B4-BE49-F238E27FC236}">
-                <a16:creationId xmlns:a16="http://schemas.microsoft.com/office/drawing/2014/main" id="{C26C7656-5DD7-9E47-8B03-D096CD8C0DC6}"/>
-              </a:ext>
-            </a:extLst>
-          </p:cNvPr>
-          <p:cNvSpPr txBox="1"/>
-          <p:nvPr/>
-        </p:nvSpPr>
-        <p:spPr>
-          <a:xfrm>
-            <a:off x="5006109" y="5615709"/>
+            <a:off x="4143467" y="6109305"/>
             <a:ext cx="5791200" cy="400110"/>
           </a:xfrm>
           <a:prstGeom prst="rect">
@@ -6908,7 +7084,7 @@
     </p:spTree>
     <p:extLst>
       <p:ext uri="{BB962C8B-B14F-4D97-AF65-F5344CB8AC3E}">
-        <p14:creationId xmlns:p14="http://schemas.microsoft.com/office/powerpoint/2010/main" val="3426748696"/>
+        <p14:creationId xmlns:p14="http://schemas.microsoft.com/office/powerpoint/2010/main" val="2844890790"/>
       </p:ext>
     </p:extLst>
   </p:cSld>
@@ -6986,25 +7162,20 @@
           <a:p>
             <a:r>
               <a:rPr lang="en-US" dirty="0"/>
-              <a:t>Change gears to originals – mentions in reviews</a:t>
-            </a:r>
-          </a:p>
-          <a:p>
-            <a:r>
-              <a:rPr lang="en-US" dirty="0"/>
-              <a:t>Interestingly we see miles and Coltrane stand out so much compared even though they’re far removed from the scene</a:t>
-            </a:r>
-          </a:p>
-          <a:p>
-            <a:r>
-              <a:rPr lang="en-US" dirty="0"/>
-              <a:t>Network graph? Colors based on </a:t>
-            </a:r>
-            <a:r>
-              <a:rPr lang="en-US"/>
-              <a:t>different subgenres?</a:t>
-            </a:r>
-            <a:endParaRPr lang="en-US" dirty="0"/>
+              <a:t>Miles and Coltrane mentions</a:t>
+            </a:r>
+          </a:p>
+          <a:p>
+            <a:r>
+              <a:rPr lang="en-US" dirty="0"/>
+              <a:t>Network graph? Colors based on different subgenres?</a:t>
+            </a:r>
+          </a:p>
+          <a:p>
+            <a:r>
+              <a:rPr lang="en-US" dirty="0"/>
+              <a:t>Old to modern to outside influence!</a:t>
+            </a:r>
           </a:p>
         </p:txBody>
       </p:sp>
@@ -7043,7 +7214,7 @@
           <p:cNvPr id="2" name="Title 1">
             <a:extLst>
               <a:ext uri="{FF2B5EF4-FFF2-40B4-BE49-F238E27FC236}">
-                <a16:creationId xmlns:a16="http://schemas.microsoft.com/office/drawing/2014/main" id="{68F4FBDE-CEC6-1E46-9310-389B1E09CD78}"/>
+                <a16:creationId xmlns:a16="http://schemas.microsoft.com/office/drawing/2014/main" id="{5B30CA4D-4F7A-7A4A-9A3C-88256E63CF94}"/>
               </a:ext>
             </a:extLst>
           </p:cNvPr>
@@ -7061,17 +7232,17 @@
           <a:p>
             <a:r>
               <a:rPr lang="en-US" dirty="0"/>
-              <a:t>Content-based Model</a:t>
-            </a:r>
-          </a:p>
-        </p:txBody>
-      </p:sp>
-      <p:sp>
-        <p:nvSpPr>
-          <p:cNvPr id="3" name="Content Placeholder 2">
-            <a:extLst>
-              <a:ext uri="{FF2B5EF4-FFF2-40B4-BE49-F238E27FC236}">
-                <a16:creationId xmlns:a16="http://schemas.microsoft.com/office/drawing/2014/main" id="{67A8C402-CA98-BB4A-89D2-96BE85A96C71}"/>
+              <a:t>EDA - </a:t>
+            </a:r>
+          </a:p>
+        </p:txBody>
+      </p:sp>
+      <p:sp>
+        <p:nvSpPr>
+          <p:cNvPr id="4" name="Content Placeholder 3">
+            <a:extLst>
+              <a:ext uri="{FF2B5EF4-FFF2-40B4-BE49-F238E27FC236}">
+                <a16:creationId xmlns:a16="http://schemas.microsoft.com/office/drawing/2014/main" id="{E013098D-D2BA-1743-A418-22847B343875}"/>
               </a:ext>
             </a:extLst>
           </p:cNvPr>
@@ -7089,27 +7260,13 @@
           <a:p>
             <a:r>
               <a:rPr lang="en-US" dirty="0"/>
-              <a:t>1. Cosine sim – using TF-IDF and Cosine sim</a:t>
-            </a:r>
-          </a:p>
-          <a:p>
-            <a:pPr lvl="1"/>
-            <a:r>
-              <a:rPr lang="en-US" dirty="0"/>
-              <a:t>Examples of similar albums</a:t>
-            </a:r>
-          </a:p>
-          <a:p>
-            <a:r>
-              <a:rPr lang="en-US" dirty="0"/>
-              <a:t>2. Cosine sim - using PCA and Cosine sim</a:t>
-            </a:r>
-          </a:p>
-          <a:p>
-            <a:pPr lvl="1"/>
-            <a:r>
-              <a:rPr lang="en-US" dirty="0"/>
-              <a:t>Examples of similar albums</a:t>
+              <a:t>Network graph? Colors based on different subgenres?</a:t>
+            </a:r>
+          </a:p>
+          <a:p>
+            <a:r>
+              <a:rPr lang="en-US" dirty="0"/>
+              <a:t>Old to modern to outside influence!</a:t>
             </a:r>
           </a:p>
         </p:txBody>
@@ -7117,7 +7274,7 @@
     </p:spTree>
     <p:extLst>
       <p:ext uri="{BB962C8B-B14F-4D97-AF65-F5344CB8AC3E}">
-        <p14:creationId xmlns:p14="http://schemas.microsoft.com/office/powerpoint/2010/main" val="480988961"/>
+        <p14:creationId xmlns:p14="http://schemas.microsoft.com/office/powerpoint/2010/main" val="1001111317"/>
       </p:ext>
     </p:extLst>
   </p:cSld>
@@ -7196,6 +7353,12 @@
             <a:r>
               <a:rPr lang="en-US" dirty="0"/>
               <a:t>Words of the reviewer can often be a reflection of the reviewer themselves but also the nature of the music</a:t>
+            </a:r>
+          </a:p>
+          <a:p>
+            <a:r>
+              <a:rPr lang="en-US" dirty="0"/>
+              <a:t>Graph emotion/sentiment of reviews over time</a:t>
             </a:r>
           </a:p>
         </p:txBody>

</xml_diff>